<commit_message>
Continuing Issue495[add more information/keywords into the index page] Update Issue 495 Merged default Tweaked images, wording, font size
</commit_message>
<xml_diff>
--- a/doc/mockups/InfoBytes.pptx
+++ b/doc/mockups/InfoBytes.pptx
@@ -294,7 +294,7 @@
             <a:fld id="{1D8BD707-D9CF-40AE-B4C6-C98DA3205C09}" type="datetimeFigureOut">
               <a:rPr lang="en-US" smtClean="0"/>
               <a:pPr/>
-              <a:t>3/6/2013</a:t>
+              <a:t>3/7/2013</a:t>
             </a:fld>
             <a:endParaRPr lang="en-US"/>
           </a:p>
@@ -514,7 +514,7 @@
             <a:fld id="{1D8BD707-D9CF-40AE-B4C6-C98DA3205C09}" type="datetimeFigureOut">
               <a:rPr lang="en-US" smtClean="0"/>
               <a:pPr/>
-              <a:t>3/6/2013</a:t>
+              <a:t>3/7/2013</a:t>
             </a:fld>
             <a:endParaRPr lang="en-US"/>
           </a:p>
@@ -691,7 +691,7 @@
             <a:fld id="{1D8BD707-D9CF-40AE-B4C6-C98DA3205C09}" type="datetimeFigureOut">
               <a:rPr lang="en-US" smtClean="0"/>
               <a:pPr/>
-              <a:t>3/6/2013</a:t>
+              <a:t>3/7/2013</a:t>
             </a:fld>
             <a:endParaRPr lang="en-US"/>
           </a:p>
@@ -858,7 +858,7 @@
             <a:fld id="{1D8BD707-D9CF-40AE-B4C6-C98DA3205C09}" type="datetimeFigureOut">
               <a:rPr lang="en-US" smtClean="0"/>
               <a:pPr/>
-              <a:t>3/6/2013</a:t>
+              <a:t>3/7/2013</a:t>
             </a:fld>
             <a:endParaRPr lang="en-US"/>
           </a:p>
@@ -1101,7 +1101,7 @@
             <a:fld id="{1D8BD707-D9CF-40AE-B4C6-C98DA3205C09}" type="datetimeFigureOut">
               <a:rPr lang="en-US" smtClean="0"/>
               <a:pPr/>
-              <a:t>3/6/2013</a:t>
+              <a:t>3/7/2013</a:t>
             </a:fld>
             <a:endParaRPr lang="en-US"/>
           </a:p>
@@ -1386,7 +1386,7 @@
             <a:fld id="{1D8BD707-D9CF-40AE-B4C6-C98DA3205C09}" type="datetimeFigureOut">
               <a:rPr lang="en-US" smtClean="0"/>
               <a:pPr/>
-              <a:t>3/6/2013</a:t>
+              <a:t>3/7/2013</a:t>
             </a:fld>
             <a:endParaRPr lang="en-US"/>
           </a:p>
@@ -1805,7 +1805,7 @@
             <a:fld id="{1D8BD707-D9CF-40AE-B4C6-C98DA3205C09}" type="datetimeFigureOut">
               <a:rPr lang="en-US" smtClean="0"/>
               <a:pPr/>
-              <a:t>3/6/2013</a:t>
+              <a:t>3/7/2013</a:t>
             </a:fld>
             <a:endParaRPr lang="en-US"/>
           </a:p>
@@ -1920,7 +1920,7 @@
             <a:fld id="{1D8BD707-D9CF-40AE-B4C6-C98DA3205C09}" type="datetimeFigureOut">
               <a:rPr lang="en-US" smtClean="0"/>
               <a:pPr/>
-              <a:t>3/6/2013</a:t>
+              <a:t>3/7/2013</a:t>
             </a:fld>
             <a:endParaRPr lang="en-US"/>
           </a:p>
@@ -2012,7 +2012,7 @@
             <a:fld id="{1D8BD707-D9CF-40AE-B4C6-C98DA3205C09}" type="datetimeFigureOut">
               <a:rPr lang="en-US" smtClean="0"/>
               <a:pPr/>
-              <a:t>3/6/2013</a:t>
+              <a:t>3/7/2013</a:t>
             </a:fld>
             <a:endParaRPr lang="en-US"/>
           </a:p>
@@ -2286,7 +2286,7 @@
             <a:fld id="{1D8BD707-D9CF-40AE-B4C6-C98DA3205C09}" type="datetimeFigureOut">
               <a:rPr lang="en-US" smtClean="0"/>
               <a:pPr/>
-              <a:t>3/6/2013</a:t>
+              <a:t>3/7/2013</a:t>
             </a:fld>
             <a:endParaRPr lang="en-US"/>
           </a:p>
@@ -2536,7 +2536,7 @@
             <a:fld id="{1D8BD707-D9CF-40AE-B4C6-C98DA3205C09}" type="datetimeFigureOut">
               <a:rPr lang="en-US" smtClean="0"/>
               <a:pPr/>
-              <a:t>3/6/2013</a:t>
+              <a:t>3/7/2013</a:t>
             </a:fld>
             <a:endParaRPr lang="en-US"/>
           </a:p>
@@ -2746,7 +2746,7 @@
             <a:fld id="{1D8BD707-D9CF-40AE-B4C6-C98DA3205C09}" type="datetimeFigureOut">
               <a:rPr lang="en-US" smtClean="0"/>
               <a:pPr/>
-              <a:t>3/6/2013</a:t>
+              <a:t>3/7/2013</a:t>
             </a:fld>
             <a:endParaRPr lang="en-US"/>
           </a:p>
@@ -10101,8 +10101,8 @@
         </p:blipFill>
         <p:spPr bwMode="auto">
           <a:xfrm>
-            <a:off x="1235208" y="1310481"/>
-            <a:ext cx="1168608" cy="381000"/>
+            <a:off x="767765" y="1310481"/>
+            <a:ext cx="1636051" cy="533400"/>
           </a:xfrm>
           <a:prstGeom prst="roundRect">
             <a:avLst>
@@ -10312,6 +10312,57 @@
           </a:extLst>
         </p:spPr>
       </p:pic>
+      <p:sp>
+        <p:nvSpPr>
+          <p:cNvPr id="2" name="Rounded Rectangle 1"/>
+          <p:cNvSpPr/>
+          <p:nvPr/>
+        </p:nvSpPr>
+        <p:spPr>
+          <a:xfrm>
+            <a:off x="2617992" y="472281"/>
+            <a:ext cx="125208" cy="914400"/>
+          </a:xfrm>
+          <a:prstGeom prst="roundRect">
+            <a:avLst>
+              <a:gd name="adj" fmla="val 47096"/>
+            </a:avLst>
+          </a:prstGeom>
+          <a:solidFill>
+            <a:schemeClr val="bg1"/>
+          </a:solidFill>
+          <a:ln>
+            <a:noFill/>
+          </a:ln>
+          <a:effectLst>
+            <a:softEdge rad="31750"/>
+          </a:effectLst>
+        </p:spPr>
+        <p:style>
+          <a:lnRef idx="2">
+            <a:schemeClr val="accent1">
+              <a:shade val="50000"/>
+            </a:schemeClr>
+          </a:lnRef>
+          <a:fillRef idx="1">
+            <a:schemeClr val="accent1"/>
+          </a:fillRef>
+          <a:effectRef idx="0">
+            <a:schemeClr val="accent1"/>
+          </a:effectRef>
+          <a:fontRef idx="minor">
+            <a:schemeClr val="lt1"/>
+          </a:fontRef>
+        </p:style>
+        <p:txBody>
+          <a:bodyPr rtlCol="0" anchor="ctr"/>
+          <a:lstStyle/>
+          <a:p>
+            <a:pPr algn="ctr"/>
+            <a:endParaRPr lang="en-SG"/>
+          </a:p>
+        </p:txBody>
+      </p:sp>
     </p:spTree>
     <p:extLst>
       <p:ext uri="{BB962C8B-B14F-4D97-AF65-F5344CB8AC3E}">

</xml_diff>